<commit_message>
Relecture slides, création repertoires
</commit_message>
<xml_diff>
--- a/12_assets/course_review.pptx
+++ b/12_assets/course_review.pptx
@@ -143,7 +143,7 @@
   <pc:docChgLst>
     <pc:chgData name="Philippe Baucour" userId="5102170ae7533958" providerId="LiveId" clId="{92FC1C5E-2783-49B0-B630-5364916B899A}"/>
     <pc:docChg chg="undo custSel addSld delSld modSld modMainMaster">
-      <pc:chgData name="Philippe Baucour" userId="5102170ae7533958" providerId="LiveId" clId="{92FC1C5E-2783-49B0-B630-5364916B899A}" dt="2024-05-20T16:57:56.781" v="4379" actId="47"/>
+      <pc:chgData name="Philippe Baucour" userId="5102170ae7533958" providerId="LiveId" clId="{92FC1C5E-2783-49B0-B630-5364916B899A}" dt="2024-05-21T05:42:45.696" v="4501" actId="20577"/>
       <pc:docMkLst>
         <pc:docMk/>
       </pc:docMkLst>
@@ -474,7 +474,7 @@
         </pc:spChg>
       </pc:sldChg>
       <pc:sldChg chg="addSp modSp new mod modClrScheme chgLayout">
-        <pc:chgData name="Philippe Baucour" userId="5102170ae7533958" providerId="LiveId" clId="{92FC1C5E-2783-49B0-B630-5364916B899A}" dt="2024-05-20T14:41:55.235" v="2119" actId="947"/>
+        <pc:chgData name="Philippe Baucour" userId="5102170ae7533958" providerId="LiveId" clId="{92FC1C5E-2783-49B0-B630-5364916B899A}" dt="2024-05-21T05:39:39.798" v="4397" actId="27636"/>
         <pc:sldMkLst>
           <pc:docMk/>
           <pc:sldMk cId="645850396" sldId="265"/>
@@ -488,7 +488,7 @@
           </ac:spMkLst>
         </pc:spChg>
         <pc:spChg chg="add mod ord">
-          <ac:chgData name="Philippe Baucour" userId="5102170ae7533958" providerId="LiveId" clId="{92FC1C5E-2783-49B0-B630-5364916B899A}" dt="2024-05-20T14:41:55.235" v="2119" actId="947"/>
+          <ac:chgData name="Philippe Baucour" userId="5102170ae7533958" providerId="LiveId" clId="{92FC1C5E-2783-49B0-B630-5364916B899A}" dt="2024-05-21T05:39:39.798" v="4397" actId="27636"/>
           <ac:spMkLst>
             <pc:docMk/>
             <pc:sldMk cId="645850396" sldId="265"/>
@@ -1463,7 +1463,7 @@
         </pc:picChg>
       </pc:sldChg>
       <pc:sldChg chg="addSp delSp modSp add mod">
-        <pc:chgData name="Philippe Baucour" userId="5102170ae7533958" providerId="LiveId" clId="{92FC1C5E-2783-49B0-B630-5364916B899A}" dt="2024-05-20T16:14:21.579" v="3192" actId="6549"/>
+        <pc:chgData name="Philippe Baucour" userId="5102170ae7533958" providerId="LiveId" clId="{92FC1C5E-2783-49B0-B630-5364916B899A}" dt="2024-05-21T05:42:45.696" v="4501" actId="20577"/>
         <pc:sldMkLst>
           <pc:docMk/>
           <pc:sldMk cId="3820477691" sldId="276"/>
@@ -1500,8 +1500,8 @@
             <ac:spMk id="6" creationId="{7D782B64-F1FF-8FDB-B53E-C92C89CC110E}"/>
           </ac:spMkLst>
         </pc:spChg>
-        <pc:spChg chg="add mod">
-          <ac:chgData name="Philippe Baucour" userId="5102170ae7533958" providerId="LiveId" clId="{92FC1C5E-2783-49B0-B630-5364916B899A}" dt="2024-05-20T14:54:43.760" v="2246" actId="6549"/>
+        <pc:spChg chg="add del mod">
+          <ac:chgData name="Philippe Baucour" userId="5102170ae7533958" providerId="LiveId" clId="{92FC1C5E-2783-49B0-B630-5364916B899A}" dt="2024-05-21T05:40:32.647" v="4399" actId="478"/>
           <ac:spMkLst>
             <pc:docMk/>
             <pc:sldMk cId="3820477691" sldId="276"/>
@@ -1509,7 +1509,7 @@
           </ac:spMkLst>
         </pc:spChg>
         <pc:spChg chg="add mod">
-          <ac:chgData name="Philippe Baucour" userId="5102170ae7533958" providerId="LiveId" clId="{92FC1C5E-2783-49B0-B630-5364916B899A}" dt="2024-05-20T15:15:34.264" v="2598" actId="1035"/>
+          <ac:chgData name="Philippe Baucour" userId="5102170ae7533958" providerId="LiveId" clId="{92FC1C5E-2783-49B0-B630-5364916B899A}" dt="2024-05-21T05:42:25.324" v="4492" actId="1036"/>
           <ac:spMkLst>
             <pc:docMk/>
             <pc:sldMk cId="3820477691" sldId="276"/>
@@ -1517,7 +1517,7 @@
           </ac:spMkLst>
         </pc:spChg>
         <pc:spChg chg="add mod">
-          <ac:chgData name="Philippe Baucour" userId="5102170ae7533958" providerId="LiveId" clId="{92FC1C5E-2783-49B0-B630-5364916B899A}" dt="2024-05-20T15:30:16.915" v="2703" actId="1036"/>
+          <ac:chgData name="Philippe Baucour" userId="5102170ae7533958" providerId="LiveId" clId="{92FC1C5E-2783-49B0-B630-5364916B899A}" dt="2024-05-21T05:42:25.324" v="4492" actId="1036"/>
           <ac:spMkLst>
             <pc:docMk/>
             <pc:sldMk cId="3820477691" sldId="276"/>
@@ -1525,7 +1525,7 @@
           </ac:spMkLst>
         </pc:spChg>
         <pc:spChg chg="add mod">
-          <ac:chgData name="Philippe Baucour" userId="5102170ae7533958" providerId="LiveId" clId="{92FC1C5E-2783-49B0-B630-5364916B899A}" dt="2024-05-20T15:15:34.264" v="2598" actId="1035"/>
+          <ac:chgData name="Philippe Baucour" userId="5102170ae7533958" providerId="LiveId" clId="{92FC1C5E-2783-49B0-B630-5364916B899A}" dt="2024-05-21T05:42:25.324" v="4492" actId="1036"/>
           <ac:spMkLst>
             <pc:docMk/>
             <pc:sldMk cId="3820477691" sldId="276"/>
@@ -1533,7 +1533,7 @@
           </ac:spMkLst>
         </pc:spChg>
         <pc:spChg chg="add mod">
-          <ac:chgData name="Philippe Baucour" userId="5102170ae7533958" providerId="LiveId" clId="{92FC1C5E-2783-49B0-B630-5364916B899A}" dt="2024-05-20T15:15:34.264" v="2598" actId="1035"/>
+          <ac:chgData name="Philippe Baucour" userId="5102170ae7533958" providerId="LiveId" clId="{92FC1C5E-2783-49B0-B630-5364916B899A}" dt="2024-05-21T05:42:25.324" v="4492" actId="1036"/>
           <ac:spMkLst>
             <pc:docMk/>
             <pc:sldMk cId="3820477691" sldId="276"/>
@@ -1541,7 +1541,7 @@
           </ac:spMkLst>
         </pc:spChg>
         <pc:spChg chg="add mod">
-          <ac:chgData name="Philippe Baucour" userId="5102170ae7533958" providerId="LiveId" clId="{92FC1C5E-2783-49B0-B630-5364916B899A}" dt="2024-05-20T15:17:18.541" v="2618" actId="1076"/>
+          <ac:chgData name="Philippe Baucour" userId="5102170ae7533958" providerId="LiveId" clId="{92FC1C5E-2783-49B0-B630-5364916B899A}" dt="2024-05-21T05:42:25.324" v="4492" actId="1036"/>
           <ac:spMkLst>
             <pc:docMk/>
             <pc:sldMk cId="3820477691" sldId="276"/>
@@ -1557,7 +1557,7 @@
           </ac:spMkLst>
         </pc:spChg>
         <pc:spChg chg="add mod">
-          <ac:chgData name="Philippe Baucour" userId="5102170ae7533958" providerId="LiveId" clId="{92FC1C5E-2783-49B0-B630-5364916B899A}" dt="2024-05-20T15:21:43.351" v="2648" actId="6549"/>
+          <ac:chgData name="Philippe Baucour" userId="5102170ae7533958" providerId="LiveId" clId="{92FC1C5E-2783-49B0-B630-5364916B899A}" dt="2024-05-21T05:41:05.781" v="4411" actId="1036"/>
           <ac:spMkLst>
             <pc:docMk/>
             <pc:sldMk cId="3820477691" sldId="276"/>
@@ -1645,7 +1645,7 @@
           </ac:spMkLst>
         </pc:spChg>
         <pc:spChg chg="add mod">
-          <ac:chgData name="Philippe Baucour" userId="5102170ae7533958" providerId="LiveId" clId="{92FC1C5E-2783-49B0-B630-5364916B899A}" dt="2024-05-20T16:11:57.279" v="3180" actId="33524"/>
+          <ac:chgData name="Philippe Baucour" userId="5102170ae7533958" providerId="LiveId" clId="{92FC1C5E-2783-49B0-B630-5364916B899A}" dt="2024-05-21T05:42:45.696" v="4501" actId="20577"/>
           <ac:spMkLst>
             <pc:docMk/>
             <pc:sldMk cId="3820477691" sldId="276"/>
@@ -1661,7 +1661,7 @@
           </ac:spMkLst>
         </pc:spChg>
         <pc:spChg chg="add mod">
-          <ac:chgData name="Philippe Baucour" userId="5102170ae7533958" providerId="LiveId" clId="{92FC1C5E-2783-49B0-B630-5364916B899A}" dt="2024-05-20T16:14:21.579" v="3192" actId="6549"/>
+          <ac:chgData name="Philippe Baucour" userId="5102170ae7533958" providerId="LiveId" clId="{92FC1C5E-2783-49B0-B630-5364916B899A}" dt="2024-05-21T05:41:16.895" v="4440" actId="1035"/>
           <ac:spMkLst>
             <pc:docMk/>
             <pc:sldMk cId="3820477691" sldId="276"/>
@@ -1669,7 +1669,7 @@
           </ac:spMkLst>
         </pc:spChg>
         <pc:picChg chg="add mod">
-          <ac:chgData name="Philippe Baucour" userId="5102170ae7533958" providerId="LiveId" clId="{92FC1C5E-2783-49B0-B630-5364916B899A}" dt="2024-05-20T15:15:34.264" v="2598" actId="1035"/>
+          <ac:chgData name="Philippe Baucour" userId="5102170ae7533958" providerId="LiveId" clId="{92FC1C5E-2783-49B0-B630-5364916B899A}" dt="2024-05-21T05:42:25.324" v="4492" actId="1036"/>
           <ac:picMkLst>
             <pc:docMk/>
             <pc:sldMk cId="3820477691" sldId="276"/>
@@ -1693,7 +1693,7 @@
           </ac:picMkLst>
         </pc:picChg>
         <pc:picChg chg="add mod">
-          <ac:chgData name="Philippe Baucour" userId="5102170ae7533958" providerId="LiveId" clId="{92FC1C5E-2783-49B0-B630-5364916B899A}" dt="2024-05-20T16:07:45.059" v="3083" actId="1076"/>
+          <ac:chgData name="Philippe Baucour" userId="5102170ae7533958" providerId="LiveId" clId="{92FC1C5E-2783-49B0-B630-5364916B899A}" dt="2024-05-21T05:41:42.365" v="4469" actId="1035"/>
           <ac:picMkLst>
             <pc:docMk/>
             <pc:sldMk cId="3820477691" sldId="276"/>
@@ -1811,7 +1811,7 @@
           <a:p>
             <a:fld id="{C5D8FFE9-C585-481A-8C95-EA03CD59938B}" type="datetimeFigureOut">
               <a:rPr lang="fr-FR" smtClean="0"/>
-              <a:t>20/05/2024</a:t>
+              <a:t>21/05/2024</a:t>
             </a:fld>
             <a:endParaRPr lang="fr-FR"/>
           </a:p>
@@ -3579,7 +3579,7 @@
           <a:p>
             <a:fld id="{E049BE60-F297-4D51-9BF6-34EA6E4A2150}" type="datetimeFigureOut">
               <a:rPr lang="fr-FR" smtClean="0"/>
-              <a:t>20/05/2024</a:t>
+              <a:t>21/05/2024</a:t>
             </a:fld>
             <a:endParaRPr lang="fr-FR"/>
           </a:p>
@@ -3777,7 +3777,7 @@
           <a:p>
             <a:fld id="{E049BE60-F297-4D51-9BF6-34EA6E4A2150}" type="datetimeFigureOut">
               <a:rPr lang="fr-FR" smtClean="0"/>
-              <a:t>20/05/2024</a:t>
+              <a:t>21/05/2024</a:t>
             </a:fld>
             <a:endParaRPr lang="fr-FR"/>
           </a:p>
@@ -3985,7 +3985,7 @@
           <a:p>
             <a:fld id="{E049BE60-F297-4D51-9BF6-34EA6E4A2150}" type="datetimeFigureOut">
               <a:rPr lang="fr-FR" smtClean="0"/>
-              <a:t>20/05/2024</a:t>
+              <a:t>21/05/2024</a:t>
             </a:fld>
             <a:endParaRPr lang="fr-FR"/>
           </a:p>
@@ -4183,7 +4183,7 @@
           <a:p>
             <a:fld id="{E049BE60-F297-4D51-9BF6-34EA6E4A2150}" type="datetimeFigureOut">
               <a:rPr lang="fr-FR" smtClean="0"/>
-              <a:t>20/05/2024</a:t>
+              <a:t>21/05/2024</a:t>
             </a:fld>
             <a:endParaRPr lang="fr-FR"/>
           </a:p>
@@ -4458,7 +4458,7 @@
           <a:p>
             <a:fld id="{E049BE60-F297-4D51-9BF6-34EA6E4A2150}" type="datetimeFigureOut">
               <a:rPr lang="fr-FR" smtClean="0"/>
-              <a:t>20/05/2024</a:t>
+              <a:t>21/05/2024</a:t>
             </a:fld>
             <a:endParaRPr lang="fr-FR"/>
           </a:p>
@@ -4723,7 +4723,7 @@
           <a:p>
             <a:fld id="{E049BE60-F297-4D51-9BF6-34EA6E4A2150}" type="datetimeFigureOut">
               <a:rPr lang="fr-FR" smtClean="0"/>
-              <a:t>20/05/2024</a:t>
+              <a:t>21/05/2024</a:t>
             </a:fld>
             <a:endParaRPr lang="fr-FR"/>
           </a:p>
@@ -5135,7 +5135,7 @@
           <a:p>
             <a:fld id="{E049BE60-F297-4D51-9BF6-34EA6E4A2150}" type="datetimeFigureOut">
               <a:rPr lang="fr-FR" smtClean="0"/>
-              <a:t>20/05/2024</a:t>
+              <a:t>21/05/2024</a:t>
             </a:fld>
             <a:endParaRPr lang="fr-FR"/>
           </a:p>
@@ -5276,7 +5276,7 @@
           <a:p>
             <a:fld id="{E049BE60-F297-4D51-9BF6-34EA6E4A2150}" type="datetimeFigureOut">
               <a:rPr lang="fr-FR" smtClean="0"/>
-              <a:t>20/05/2024</a:t>
+              <a:t>21/05/2024</a:t>
             </a:fld>
             <a:endParaRPr lang="fr-FR"/>
           </a:p>
@@ -5389,7 +5389,7 @@
           <a:p>
             <a:fld id="{E049BE60-F297-4D51-9BF6-34EA6E4A2150}" type="datetimeFigureOut">
               <a:rPr lang="fr-FR" smtClean="0"/>
-              <a:t>20/05/2024</a:t>
+              <a:t>21/05/2024</a:t>
             </a:fld>
             <a:endParaRPr lang="fr-FR"/>
           </a:p>
@@ -5700,7 +5700,7 @@
           <a:p>
             <a:fld id="{E049BE60-F297-4D51-9BF6-34EA6E4A2150}" type="datetimeFigureOut">
               <a:rPr lang="fr-FR" smtClean="0"/>
-              <a:t>20/05/2024</a:t>
+              <a:t>21/05/2024</a:t>
             </a:fld>
             <a:endParaRPr lang="fr-FR"/>
           </a:p>
@@ -5991,7 +5991,7 @@
           <a:p>
             <a:fld id="{E049BE60-F297-4D51-9BF6-34EA6E4A2150}" type="datetimeFigureOut">
               <a:rPr lang="fr-FR" smtClean="0"/>
-              <a:t>20/05/2024</a:t>
+              <a:t>21/05/2024</a:t>
             </a:fld>
             <a:endParaRPr lang="fr-FR"/>
           </a:p>
@@ -6232,7 +6232,7 @@
           <a:p>
             <a:fld id="{E049BE60-F297-4D51-9BF6-34EA6E4A2150}" type="datetimeFigureOut">
               <a:rPr lang="fr-FR" smtClean="0"/>
-              <a:t>20/05/2024</a:t>
+              <a:t>21/05/2024</a:t>
             </a:fld>
             <a:endParaRPr lang="fr-FR"/>
           </a:p>
@@ -7639,7 +7639,7 @@
                 <a:effectLst/>
                 <a:latin typeface="Courier New" panose="02070309020205020404" pitchFamily="49" charset="0"/>
               </a:rPr>
-              <a:t> valeurs (des features pour chaque mot</a:t>
+              <a:t> valeurs (des features pour chaque mot)</a:t>
             </a:r>
           </a:p>
           <a:p>
@@ -7795,7 +7795,7 @@
                 <a:effectLst/>
                 <a:latin typeface="Courier New" panose="02070309020205020404" pitchFamily="49" charset="0"/>
               </a:rPr>
-              <a:t>Pas de transfert learning</a:t>
+              <a:t>Pas de transfert learning possible</a:t>
             </a:r>
           </a:p>
           <a:p>
@@ -7814,6 +7814,137 @@
                 <a:effectLst/>
                 <a:latin typeface="Courier New" panose="02070309020205020404" pitchFamily="49" charset="0"/>
               </a:rPr>
+              <a:t>GlobalAveragePooling1D (couche GAP)</a:t>
+            </a:r>
+          </a:p>
+          <a:p>
+            <a:pPr lvl="1" fontAlgn="ctr">
+              <a:spcBef>
+                <a:spcPts val="0"/>
+              </a:spcBef>
+              <a:buFont typeface="Courier New" panose="02070309020205020404" pitchFamily="49" charset="0"/>
+              <a:buChar char="o"/>
+            </a:pPr>
+            <a:r>
+              <a:rPr lang="fr-FR" sz="1400" dirty="0">
+                <a:effectLst/>
+                <a:latin typeface="Courier New" panose="02070309020205020404" pitchFamily="49" charset="0"/>
+              </a:rPr>
+              <a:t>Après la couche Word Embedding</a:t>
+            </a:r>
+          </a:p>
+          <a:p>
+            <a:pPr lvl="1" fontAlgn="ctr">
+              <a:spcBef>
+                <a:spcPts val="0"/>
+              </a:spcBef>
+              <a:buFont typeface="Courier New" panose="02070309020205020404" pitchFamily="49" charset="0"/>
+              <a:buChar char="o"/>
+            </a:pPr>
+            <a:r>
+              <a:rPr lang="fr-FR" sz="1400" dirty="0">
+                <a:effectLst/>
+                <a:latin typeface="Courier New" panose="02070309020205020404" pitchFamily="49" charset="0"/>
+              </a:rPr>
+              <a:t>Moyenne par colonne de la matrice Word Embedding</a:t>
+            </a:r>
+          </a:p>
+          <a:p>
+            <a:pPr lvl="1" fontAlgn="ctr">
+              <a:spcBef>
+                <a:spcPts val="0"/>
+              </a:spcBef>
+              <a:buFont typeface="Courier New" panose="02070309020205020404" pitchFamily="49" charset="0"/>
+              <a:buChar char="o"/>
+            </a:pPr>
+            <a:r>
+              <a:rPr lang="fr-FR" sz="1400" dirty="0">
+                <a:effectLst/>
+                <a:latin typeface="Courier New" panose="02070309020205020404" pitchFamily="49" charset="0"/>
+              </a:rPr>
+              <a:t>En sortie un vecteur du nombre de colonnes de la matrice (</a:t>
+            </a:r>
+            <a:r>
+              <a:rPr lang="fr-FR" sz="1400" dirty="0" err="1">
+                <a:effectLst/>
+                <a:latin typeface="Courier New" panose="02070309020205020404" pitchFamily="49" charset="0"/>
+              </a:rPr>
+              <a:t>n_dim</a:t>
+            </a:r>
+            <a:r>
+              <a:rPr lang="fr-FR" sz="1400" dirty="0">
+                <a:effectLst/>
+                <a:latin typeface="Courier New" panose="02070309020205020404" pitchFamily="49" charset="0"/>
+              </a:rPr>
+              <a:t>=2</a:t>
+            </a:r>
+            <a:r>
+              <a:rPr lang="fr-FR" sz="1400" baseline="30000" dirty="0">
+                <a:effectLst/>
+                <a:latin typeface="Courier New" panose="02070309020205020404" pitchFamily="49" charset="0"/>
+              </a:rPr>
+              <a:t>n</a:t>
+            </a:r>
+            <a:r>
+              <a:rPr lang="fr-FR" sz="1400" dirty="0">
+                <a:effectLst/>
+                <a:latin typeface="Courier New" panose="02070309020205020404" pitchFamily="49" charset="0"/>
+              </a:rPr>
+              <a:t>)</a:t>
+            </a:r>
+          </a:p>
+          <a:p>
+            <a:pPr lvl="1" fontAlgn="ctr">
+              <a:spcBef>
+                <a:spcPts val="0"/>
+              </a:spcBef>
+              <a:buFont typeface="Courier New" panose="02070309020205020404" pitchFamily="49" charset="0"/>
+              <a:buChar char="o"/>
+            </a:pPr>
+            <a:r>
+              <a:rPr lang="fr-FR" sz="1400" dirty="0">
+                <a:effectLst/>
+                <a:latin typeface="Courier New" panose="02070309020205020404" pitchFamily="49" charset="0"/>
+              </a:rPr>
+              <a:t>Faut présenter un vecteur pour le "brancher" à l'entrée des couches denses. </a:t>
+            </a:r>
+          </a:p>
+          <a:p>
+            <a:pPr lvl="1" fontAlgn="ctr">
+              <a:spcBef>
+                <a:spcPts val="0"/>
+              </a:spcBef>
+              <a:buFont typeface="Courier New" panose="02070309020205020404" pitchFamily="49" charset="0"/>
+              <a:buChar char="o"/>
+            </a:pPr>
+            <a:r>
+              <a:rPr lang="fr-FR" sz="1400" dirty="0">
+                <a:effectLst/>
+                <a:latin typeface="Courier New" panose="02070309020205020404" pitchFamily="49" charset="0"/>
+              </a:rPr>
+              <a:t>Donc à la sortie de la couche GlobalAveragePoolong1D on perd l'ordre de la séquence d'entrée</a:t>
+            </a:r>
+            <a:endParaRPr lang="fr-FR" sz="1600" dirty="0">
+              <a:effectLst/>
+              <a:latin typeface="Courier New" panose="02070309020205020404" pitchFamily="49" charset="0"/>
+            </a:endParaRPr>
+          </a:p>
+          <a:p>
+            <a:pPr rtl="0" fontAlgn="ctr">
+              <a:spcBef>
+                <a:spcPts val="0"/>
+              </a:spcBef>
+              <a:spcAft>
+                <a:spcPts val="0"/>
+              </a:spcAft>
+              <a:buFont typeface="Arial" panose="020B0604020202020204" pitchFamily="34" charset="0"/>
+              <a:buChar char="•"/>
+            </a:pPr>
+            <a:r>
+              <a:rPr lang="fr-FR" sz="1600" dirty="0">
+                <a:effectLst/>
+                <a:latin typeface="Courier New" panose="02070309020205020404" pitchFamily="49" charset="0"/>
+              </a:rPr>
               <a:t>Word2Vec (pas besoin d'être supervisé)</a:t>
             </a:r>
           </a:p>
@@ -7923,144 +8054,6 @@
                 <a:latin typeface="Courier New" panose="02070309020205020404" pitchFamily="49" charset="0"/>
               </a:rPr>
               <a:t>Taches généralistes =&gt; on peut faire du transfert learning</a:t>
-            </a:r>
-          </a:p>
-          <a:p>
-            <a:pPr rtl="0" fontAlgn="ctr">
-              <a:spcBef>
-                <a:spcPts val="0"/>
-              </a:spcBef>
-              <a:spcAft>
-                <a:spcPts val="0"/>
-              </a:spcAft>
-              <a:buFont typeface="Arial" panose="020B0604020202020204" pitchFamily="34" charset="0"/>
-              <a:buChar char="•"/>
-            </a:pPr>
-            <a:r>
-              <a:rPr lang="fr-FR" sz="1600" dirty="0">
-                <a:effectLst/>
-                <a:latin typeface="Courier New" panose="02070309020205020404" pitchFamily="49" charset="0"/>
-              </a:rPr>
-              <a:t>GlobalAveragePooling1D (couche GAP)</a:t>
-            </a:r>
-          </a:p>
-          <a:p>
-            <a:pPr lvl="1" fontAlgn="ctr">
-              <a:spcBef>
-                <a:spcPts val="0"/>
-              </a:spcBef>
-              <a:buFont typeface="Courier New" panose="02070309020205020404" pitchFamily="49" charset="0"/>
-              <a:buChar char="o"/>
-            </a:pPr>
-            <a:r>
-              <a:rPr lang="fr-FR" sz="1400" dirty="0">
-                <a:effectLst/>
-                <a:latin typeface="Courier New" panose="02070309020205020404" pitchFamily="49" charset="0"/>
-              </a:rPr>
-              <a:t>Après la couche Word </a:t>
-            </a:r>
-            <a:r>
-              <a:rPr lang="fr-FR" sz="1400" dirty="0" err="1">
-                <a:effectLst/>
-                <a:latin typeface="Courier New" panose="02070309020205020404" pitchFamily="49" charset="0"/>
-              </a:rPr>
-              <a:t>Embeding</a:t>
-            </a:r>
-            <a:endParaRPr lang="fr-FR" sz="1400" dirty="0">
-              <a:effectLst/>
-              <a:latin typeface="Courier New" panose="02070309020205020404" pitchFamily="49" charset="0"/>
-            </a:endParaRPr>
-          </a:p>
-          <a:p>
-            <a:pPr lvl="1" fontAlgn="ctr">
-              <a:spcBef>
-                <a:spcPts val="0"/>
-              </a:spcBef>
-              <a:buFont typeface="Courier New" panose="02070309020205020404" pitchFamily="49" charset="0"/>
-              <a:buChar char="o"/>
-            </a:pPr>
-            <a:r>
-              <a:rPr lang="fr-FR" sz="1400" dirty="0">
-                <a:effectLst/>
-                <a:latin typeface="Courier New" panose="02070309020205020404" pitchFamily="49" charset="0"/>
-              </a:rPr>
-              <a:t>Moyenne par colonne de la matrice Word Embedding</a:t>
-            </a:r>
-          </a:p>
-          <a:p>
-            <a:pPr lvl="1" fontAlgn="ctr">
-              <a:spcBef>
-                <a:spcPts val="0"/>
-              </a:spcBef>
-              <a:buFont typeface="Courier New" panose="02070309020205020404" pitchFamily="49" charset="0"/>
-              <a:buChar char="o"/>
-            </a:pPr>
-            <a:r>
-              <a:rPr lang="fr-FR" sz="1400" dirty="0">
-                <a:effectLst/>
-                <a:latin typeface="Courier New" panose="02070309020205020404" pitchFamily="49" charset="0"/>
-              </a:rPr>
-              <a:t>En sortie un vecteur du nombre de colonnes de la matrice (</a:t>
-            </a:r>
-            <a:r>
-              <a:rPr lang="fr-FR" sz="1400" dirty="0" err="1">
-                <a:effectLst/>
-                <a:latin typeface="Courier New" panose="02070309020205020404" pitchFamily="49" charset="0"/>
-              </a:rPr>
-              <a:t>n_dim</a:t>
-            </a:r>
-            <a:r>
-              <a:rPr lang="fr-FR" sz="1400" dirty="0">
-                <a:effectLst/>
-                <a:latin typeface="Courier New" panose="02070309020205020404" pitchFamily="49" charset="0"/>
-              </a:rPr>
-              <a:t>=2</a:t>
-            </a:r>
-            <a:r>
-              <a:rPr lang="fr-FR" sz="1400" baseline="30000" dirty="0">
-                <a:effectLst/>
-                <a:latin typeface="Courier New" panose="02070309020205020404" pitchFamily="49" charset="0"/>
-              </a:rPr>
-              <a:t>n</a:t>
-            </a:r>
-            <a:r>
-              <a:rPr lang="fr-FR" sz="1400" dirty="0">
-                <a:effectLst/>
-                <a:latin typeface="Courier New" panose="02070309020205020404" pitchFamily="49" charset="0"/>
-              </a:rPr>
-              <a:t>)</a:t>
-            </a:r>
-          </a:p>
-          <a:p>
-            <a:pPr lvl="1" fontAlgn="ctr">
-              <a:spcBef>
-                <a:spcPts val="0"/>
-              </a:spcBef>
-              <a:buFont typeface="Courier New" panose="02070309020205020404" pitchFamily="49" charset="0"/>
-              <a:buChar char="o"/>
-            </a:pPr>
-            <a:r>
-              <a:rPr lang="fr-FR" sz="1400" dirty="0">
-                <a:effectLst/>
-                <a:latin typeface="Courier New" panose="02070309020205020404" pitchFamily="49" charset="0"/>
-              </a:rPr>
-              <a:t>Faut présenter un vecteur pour le "brancher" à l'entrée des couches denses. </a:t>
-            </a:r>
-          </a:p>
-          <a:p>
-            <a:pPr lvl="1" fontAlgn="ctr">
-              <a:spcBef>
-                <a:spcPts val="0"/>
-              </a:spcBef>
-              <a:buFont typeface="Courier New" panose="02070309020205020404" pitchFamily="49" charset="0"/>
-              <a:buChar char="o"/>
-            </a:pPr>
-            <a:r>
-              <a:rPr lang="fr-FR" sz="1400" dirty="0">
-                <a:effectLst/>
-                <a:latin typeface="Courier New" panose="02070309020205020404" pitchFamily="49" charset="0"/>
-              </a:rPr>
-              <a:t>Donc à la sortie de la couche GlobalAveragePoolong1D on perd l'ordre de la séquence d'entrée</a:t>
             </a:r>
           </a:p>
           <a:p>
@@ -9871,7 +9864,7 @@
         </p:blipFill>
         <p:spPr>
           <a:xfrm>
-            <a:off x="8248658" y="1228390"/>
+            <a:off x="8248658" y="1364575"/>
             <a:ext cx="3884831" cy="2095454"/>
           </a:xfrm>
           <a:prstGeom prst="rect">
@@ -9881,10 +9874,10 @@
       </p:pic>
       <p:sp>
         <p:nvSpPr>
-          <p:cNvPr id="8" name="ZoneTexte 7">
-            <a:extLst>
-              <a:ext uri="{FF2B5EF4-FFF2-40B4-BE49-F238E27FC236}">
-                <a16:creationId xmlns:a16="http://schemas.microsoft.com/office/drawing/2014/main" id="{F9404919-C04B-CB0B-B06A-B4CA1CFE91B0}"/>
+          <p:cNvPr id="9" name="ZoneTexte 8">
+            <a:extLst>
+              <a:ext uri="{FF2B5EF4-FFF2-40B4-BE49-F238E27FC236}">
+                <a16:creationId xmlns:a16="http://schemas.microsoft.com/office/drawing/2014/main" id="{0A0DE426-0D64-87F0-27F4-A878D15E2B7E}"/>
               </a:ext>
             </a:extLst>
           </p:cNvPr>
@@ -9893,61 +9886,7 @@
         </p:nvSpPr>
         <p:spPr>
           <a:xfrm>
-            <a:off x="9497503" y="454307"/>
-            <a:ext cx="569387" cy="246221"/>
-          </a:xfrm>
-          <a:prstGeom prst="rect">
-            <a:avLst/>
-          </a:prstGeom>
-          <a:solidFill>
-            <a:srgbClr val="EC7E78"/>
-          </a:solidFill>
-          <a:effectLst>
-            <a:outerShdw blurRad="50800" dist="38100" dir="2700000" algn="tl" rotWithShape="0">
-              <a:prstClr val="black">
-                <a:alpha val="40000"/>
-              </a:prstClr>
-            </a:outerShdw>
-          </a:effectLst>
-        </p:spPr>
-        <p:txBody>
-          <a:bodyPr wrap="none" rtlCol="0">
-            <a:spAutoFit/>
-          </a:bodyPr>
-          <a:lstStyle>
-            <a:defPPr>
-              <a:defRPr lang="fr-FR"/>
-            </a:defPPr>
-            <a:lvl1pPr>
-              <a:defRPr sz="1000">
-                <a:latin typeface="Courier New" panose="02070309020205020404" pitchFamily="49" charset="0"/>
-                <a:cs typeface="Courier New" panose="02070309020205020404" pitchFamily="49" charset="0"/>
-              </a:defRPr>
-            </a:lvl1pPr>
-          </a:lstStyle>
-          <a:p>
-            <a:r>
-              <a:rPr lang="fr-FR" dirty="0"/>
-              <a:t>Ct = </a:t>
-            </a:r>
-          </a:p>
-        </p:txBody>
-      </p:sp>
-      <p:sp>
-        <p:nvSpPr>
-          <p:cNvPr id="9" name="ZoneTexte 8">
-            <a:extLst>
-              <a:ext uri="{FF2B5EF4-FFF2-40B4-BE49-F238E27FC236}">
-                <a16:creationId xmlns:a16="http://schemas.microsoft.com/office/drawing/2014/main" id="{0A0DE426-0D64-87F0-27F4-A878D15E2B7E}"/>
-              </a:ext>
-            </a:extLst>
-          </p:cNvPr>
-          <p:cNvSpPr txBox="1"/>
-          <p:nvPr/>
-        </p:nvSpPr>
-        <p:spPr>
-          <a:xfrm>
-            <a:off x="10801074" y="1504695"/>
+            <a:off x="10801074" y="1640880"/>
             <a:ext cx="1332416" cy="215444"/>
           </a:xfrm>
           <a:prstGeom prst="rect">
@@ -10067,7 +10006,7 @@
         </p:nvSpPr>
         <p:spPr>
           <a:xfrm>
-            <a:off x="8921649" y="2040493"/>
+            <a:off x="8921649" y="2176678"/>
             <a:ext cx="530915" cy="215444"/>
           </a:xfrm>
           <a:prstGeom prst="rect">
@@ -10133,7 +10072,7 @@
         </p:nvSpPr>
         <p:spPr>
           <a:xfrm>
-            <a:off x="9594708" y="1923478"/>
+            <a:off x="9594708" y="2059663"/>
             <a:ext cx="530915" cy="215444"/>
           </a:xfrm>
           <a:prstGeom prst="rect">
@@ -10199,7 +10138,7 @@
         </p:nvSpPr>
         <p:spPr>
           <a:xfrm>
-            <a:off x="10954116" y="2307311"/>
+            <a:off x="10954116" y="2437011"/>
             <a:ext cx="530915" cy="215444"/>
           </a:xfrm>
           <a:prstGeom prst="rect">
@@ -10265,7 +10204,7 @@
         </p:nvSpPr>
         <p:spPr>
           <a:xfrm>
-            <a:off x="10332035" y="3084636"/>
+            <a:off x="10332035" y="3220821"/>
             <a:ext cx="938077" cy="215444"/>
           </a:xfrm>
           <a:prstGeom prst="rect">
@@ -10335,7 +10274,7 @@
         </p:nvSpPr>
         <p:spPr>
           <a:xfrm>
-            <a:off x="8253979" y="3737478"/>
+            <a:off x="8253979" y="3640203"/>
             <a:ext cx="3860516" cy="2554545"/>
           </a:xfrm>
           <a:prstGeom prst="rect">
@@ -12527,7 +12466,7 @@
         </p:nvSpPr>
         <p:spPr>
           <a:xfrm>
-            <a:off x="83993" y="3133974"/>
+            <a:off x="83993" y="3639813"/>
             <a:ext cx="3860516" cy="1774845"/>
           </a:xfrm>
           <a:prstGeom prst="rect">
@@ -12567,19 +12506,8 @@
                 <a:effectLst/>
                 <a:latin typeface="Courier New" panose="02070309020205020404" pitchFamily="49" charset="0"/>
               </a:rPr>
-              <a:t> remplace GlobalAveragePooling1D qui faisait perdre l'ordre de la </a:t>
-            </a:r>
-            <a:r>
-              <a:rPr lang="fr-FR" sz="800" dirty="0" err="1">
-                <a:effectLst/>
-                <a:latin typeface="Courier New" panose="02070309020205020404" pitchFamily="49" charset="0"/>
-              </a:rPr>
-              <a:t>sequence</a:t>
-            </a:r>
-            <a:endParaRPr lang="fr-FR" sz="800" dirty="0">
-              <a:effectLst/>
-              <a:latin typeface="Courier New" panose="02070309020205020404" pitchFamily="49" charset="0"/>
-            </a:endParaRPr>
+              <a:t> remplace GlobalAveragePooling1D qui faisait perdre l'ordre de la séquence</a:t>
+            </a:r>
           </a:p>
           <a:p>
             <a:pPr rtl="0" fontAlgn="ctr">
@@ -12618,10 +12546,16 @@
               </a:spcAft>
             </a:pPr>
             <a:r>
+              <a:rPr lang="fr-FR" sz="800">
+                <a:latin typeface="Courier New" panose="02070309020205020404" pitchFamily="49" charset="0"/>
+              </a:rPr>
+              <a:t>h </a:t>
+            </a:r>
+            <a:r>
               <a:rPr lang="fr-FR" sz="800" dirty="0">
                 <a:latin typeface="Courier New" panose="02070309020205020404" pitchFamily="49" charset="0"/>
               </a:rPr>
-              <a:t>Voir que h est constant par ligne calculée. Il vaut 0, puis 0.8, puis-0.1…</a:t>
+              <a:t>est constant par ligne calculée. Il vaut 0, puis 0.8, puis-0.1…</a:t>
             </a:r>
           </a:p>
           <a:p>
@@ -12817,7 +12751,7 @@
         </p:blipFill>
         <p:spPr>
           <a:xfrm>
-            <a:off x="676289" y="3424592"/>
+            <a:off x="676289" y="3917460"/>
             <a:ext cx="2580844" cy="253121"/>
           </a:xfrm>
           <a:prstGeom prst="rect">
@@ -12839,7 +12773,7 @@
         </p:nvSpPr>
         <p:spPr>
           <a:xfrm rot="21051358">
-            <a:off x="1165075" y="4785708"/>
+            <a:off x="1165075" y="5291547"/>
             <a:ext cx="1107996" cy="246221"/>
           </a:xfrm>
           <a:prstGeom prst="rect">

</xml_diff>